<commit_message>
cleaned plots, and added slide to powerpoint
</commit_message>
<xml_diff>
--- a/Disney_Project.pptx
+++ b/Disney_Project.pptx
@@ -8,6 +8,7 @@
     <p:sldId id="256" r:id="rId2"/>
     <p:sldId id="257" r:id="rId3"/>
     <p:sldId id="258" r:id="rId4"/>
+    <p:sldId id="259" r:id="rId5"/>
   </p:sldIdLst>
   <p:sldSz cx="12192000" cy="6858000"/>
   <p:notesSz cx="6858000" cy="9144000"/>
@@ -106,6 +107,11 @@
       </a:defRPr>
     </a:lvl9pPr>
   </p:defaultTextStyle>
+  <p:extLst>
+    <p:ext uri="{EFAFB233-063F-42B5-8137-9DF3F51BA10A}">
+      <p15:sldGuideLst xmlns:p15="http://schemas.microsoft.com/office/powerpoint/2012/main"/>
+    </p:ext>
+  </p:extLst>
 </p:presentation>
 </file>
 
@@ -431,7 +437,7 @@
           <a:p>
             <a:fld id="{8500C1BD-8E4F-4625-B116-799FC9C171F9}" type="datetimeFigureOut">
               <a:rPr lang="en-US" smtClean="0"/>
-              <a:t>4/27/2021</a:t>
+              <a:t>4/28/2021</a:t>
             </a:fld>
             <a:endParaRPr lang="en-US"/>
           </a:p>
@@ -867,7 +873,7 @@
           <a:p>
             <a:fld id="{8500C1BD-8E4F-4625-B116-799FC9C171F9}" type="datetimeFigureOut">
               <a:rPr lang="en-US" smtClean="0"/>
-              <a:t>4/27/2021</a:t>
+              <a:t>4/28/2021</a:t>
             </a:fld>
             <a:endParaRPr lang="en-US"/>
           </a:p>
@@ -1117,7 +1123,7 @@
           <a:p>
             <a:fld id="{8500C1BD-8E4F-4625-B116-799FC9C171F9}" type="datetimeFigureOut">
               <a:rPr lang="en-US" smtClean="0"/>
-              <a:t>4/27/2021</a:t>
+              <a:t>4/28/2021</a:t>
             </a:fld>
             <a:endParaRPr lang="en-US"/>
           </a:p>
@@ -1425,7 +1431,7 @@
           <a:p>
             <a:fld id="{8500C1BD-8E4F-4625-B116-799FC9C171F9}" type="datetimeFigureOut">
               <a:rPr lang="en-US" smtClean="0"/>
-              <a:t>4/27/2021</a:t>
+              <a:t>4/28/2021</a:t>
             </a:fld>
             <a:endParaRPr lang="en-US"/>
           </a:p>
@@ -1743,7 +1749,7 @@
           <a:p>
             <a:fld id="{8500C1BD-8E4F-4625-B116-799FC9C171F9}" type="datetimeFigureOut">
               <a:rPr lang="en-US" smtClean="0"/>
-              <a:t>4/27/2021</a:t>
+              <a:t>4/28/2021</a:t>
             </a:fld>
             <a:endParaRPr lang="en-US"/>
           </a:p>
@@ -2045,7 +2051,7 @@
           <a:p>
             <a:fld id="{8500C1BD-8E4F-4625-B116-799FC9C171F9}" type="datetimeFigureOut">
               <a:rPr lang="en-US" smtClean="0"/>
-              <a:t>4/27/2021</a:t>
+              <a:t>4/28/2021</a:t>
             </a:fld>
             <a:endParaRPr lang="en-US"/>
           </a:p>
@@ -2412,7 +2418,7 @@
           <a:p>
             <a:fld id="{8500C1BD-8E4F-4625-B116-799FC9C171F9}" type="datetimeFigureOut">
               <a:rPr lang="en-US" smtClean="0"/>
-              <a:t>4/27/2021</a:t>
+              <a:t>4/28/2021</a:t>
             </a:fld>
             <a:endParaRPr lang="en-US"/>
           </a:p>
@@ -2586,7 +2592,7 @@
           <a:p>
             <a:fld id="{8500C1BD-8E4F-4625-B116-799FC9C171F9}" type="datetimeFigureOut">
               <a:rPr lang="en-US" smtClean="0"/>
-              <a:t>4/27/2021</a:t>
+              <a:t>4/28/2021</a:t>
             </a:fld>
             <a:endParaRPr lang="en-US"/>
           </a:p>
@@ -2766,7 +2772,7 @@
           <a:p>
             <a:fld id="{8500C1BD-8E4F-4625-B116-799FC9C171F9}" type="datetimeFigureOut">
               <a:rPr lang="en-US" smtClean="0"/>
-              <a:t>4/27/2021</a:t>
+              <a:t>4/28/2021</a:t>
             </a:fld>
             <a:endParaRPr lang="en-US"/>
           </a:p>
@@ -2936,7 +2942,7 @@
           <a:p>
             <a:fld id="{8500C1BD-8E4F-4625-B116-799FC9C171F9}" type="datetimeFigureOut">
               <a:rPr lang="en-US" smtClean="0"/>
-              <a:t>4/27/2021</a:t>
+              <a:t>4/28/2021</a:t>
             </a:fld>
             <a:endParaRPr lang="en-US"/>
           </a:p>
@@ -3186,7 +3192,7 @@
           <a:p>
             <a:fld id="{8500C1BD-8E4F-4625-B116-799FC9C171F9}" type="datetimeFigureOut">
               <a:rPr lang="en-US" smtClean="0"/>
-              <a:t>4/27/2021</a:t>
+              <a:t>4/28/2021</a:t>
             </a:fld>
             <a:endParaRPr lang="en-US"/>
           </a:p>
@@ -3422,7 +3428,7 @@
           <a:p>
             <a:fld id="{8500C1BD-8E4F-4625-B116-799FC9C171F9}" type="datetimeFigureOut">
               <a:rPr lang="en-US" smtClean="0"/>
-              <a:t>4/27/2021</a:t>
+              <a:t>4/28/2021</a:t>
             </a:fld>
             <a:endParaRPr lang="en-US"/>
           </a:p>
@@ -3804,7 +3810,7 @@
           <a:p>
             <a:fld id="{8500C1BD-8E4F-4625-B116-799FC9C171F9}" type="datetimeFigureOut">
               <a:rPr lang="en-US" smtClean="0"/>
-              <a:t>4/27/2021</a:t>
+              <a:t>4/28/2021</a:t>
             </a:fld>
             <a:endParaRPr lang="en-US"/>
           </a:p>
@@ -3922,7 +3928,7 @@
           <a:p>
             <a:fld id="{8500C1BD-8E4F-4625-B116-799FC9C171F9}" type="datetimeFigureOut">
               <a:rPr lang="en-US" smtClean="0"/>
-              <a:t>4/27/2021</a:t>
+              <a:t>4/28/2021</a:t>
             </a:fld>
             <a:endParaRPr lang="en-US"/>
           </a:p>
@@ -4017,7 +4023,7 @@
           <a:p>
             <a:fld id="{8500C1BD-8E4F-4625-B116-799FC9C171F9}" type="datetimeFigureOut">
               <a:rPr lang="en-US" smtClean="0"/>
-              <a:t>4/27/2021</a:t>
+              <a:t>4/28/2021</a:t>
             </a:fld>
             <a:endParaRPr lang="en-US"/>
           </a:p>
@@ -4272,7 +4278,7 @@
           <a:p>
             <a:fld id="{8500C1BD-8E4F-4625-B116-799FC9C171F9}" type="datetimeFigureOut">
               <a:rPr lang="en-US" smtClean="0"/>
-              <a:t>4/27/2021</a:t>
+              <a:t>4/28/2021</a:t>
             </a:fld>
             <a:endParaRPr lang="en-US"/>
           </a:p>
@@ -4555,7 +4561,7 @@
           <a:p>
             <a:fld id="{8500C1BD-8E4F-4625-B116-799FC9C171F9}" type="datetimeFigureOut">
               <a:rPr lang="en-US" smtClean="0"/>
-              <a:t>4/27/2021</a:t>
+              <a:t>4/28/2021</a:t>
             </a:fld>
             <a:endParaRPr lang="en-US"/>
           </a:p>
@@ -4961,7 +4967,7 @@
           <a:p>
             <a:fld id="{8500C1BD-8E4F-4625-B116-799FC9C171F9}" type="datetimeFigureOut">
               <a:rPr lang="en-US" smtClean="0"/>
-              <a:t>4/27/2021</a:t>
+              <a:t>4/28/2021</a:t>
             </a:fld>
             <a:endParaRPr lang="en-US"/>
           </a:p>
@@ -5641,7 +5647,7 @@
           <a:p>
             <a:r>
               <a:rPr lang="en-US" dirty="0"/>
-              <a:t>Hema Vyas / Matt Weiper</a:t>
+              <a:t>Matt Weiper / Hema Vyas</a:t>
             </a:r>
           </a:p>
         </p:txBody>
@@ -5887,31 +5893,6 @@
       </p:grpSpPr>
       <p:sp>
         <p:nvSpPr>
-          <p:cNvPr id="2" name="Title 1">
-            <a:extLst>
-              <a:ext uri="{FF2B5EF4-FFF2-40B4-BE49-F238E27FC236}">
-                <a16:creationId xmlns:a16="http://schemas.microsoft.com/office/drawing/2014/main" id="{2FA24A23-7053-4E46-A0CC-67135685EF51}"/>
-              </a:ext>
-            </a:extLst>
-          </p:cNvPr>
-          <p:cNvSpPr>
-            <a:spLocks noGrp="1"/>
-          </p:cNvSpPr>
-          <p:nvPr>
-            <p:ph type="title"/>
-          </p:nvPr>
-        </p:nvSpPr>
-        <p:spPr/>
-        <p:txBody>
-          <a:bodyPr/>
-          <a:lstStyle/>
-          <a:p>
-            <a:endParaRPr lang="en-US"/>
-          </a:p>
-        </p:txBody>
-      </p:sp>
-      <p:sp>
-        <p:nvSpPr>
           <p:cNvPr id="3" name="Text Placeholder 2">
             <a:extLst>
               <a:ext uri="{FF2B5EF4-FFF2-40B4-BE49-F238E27FC236}">
@@ -5926,19 +5907,270 @@
             <p:ph type="body" idx="1"/>
           </p:nvPr>
         </p:nvSpPr>
-        <p:spPr/>
-        <p:txBody>
-          <a:bodyPr/>
-          <a:lstStyle/>
-          <a:p>
-            <a:endParaRPr lang="en-US"/>
-          </a:p>
-        </p:txBody>
-      </p:sp>
+        <p:spPr>
+          <a:xfrm>
+            <a:off x="472178" y="387625"/>
+            <a:ext cx="10421109" cy="5628862"/>
+          </a:xfrm>
+        </p:spPr>
+        <p:txBody>
+          <a:bodyPr>
+            <a:normAutofit/>
+          </a:bodyPr>
+          <a:lstStyle/>
+          <a:p>
+            <a:r>
+              <a:rPr lang="en-US" sz="3200" b="1" dirty="0"/>
+              <a:t>Getting Started</a:t>
+            </a:r>
+          </a:p>
+          <a:p>
+            <a:pPr marL="285750" indent="-285750">
+              <a:buFontTx/>
+              <a:buChar char="-"/>
+            </a:pPr>
+            <a:r>
+              <a:rPr lang="en-US" dirty="0"/>
+              <a:t>In order to get answers for our questions we wanted to find a good reliable dataset, which had columns for release data, genre, rating, and gross. </a:t>
+            </a:r>
+          </a:p>
+          <a:p>
+            <a:pPr marL="285750" indent="-285750">
+              <a:buFontTx/>
+              <a:buChar char="-"/>
+            </a:pPr>
+            <a:r>
+              <a:rPr lang="en-US" dirty="0"/>
+              <a:t>We believed with that data we could create new </a:t>
+            </a:r>
+            <a:r>
+              <a:rPr lang="en-US" dirty="0" err="1"/>
+              <a:t>dataframes</a:t>
+            </a:r>
+            <a:r>
+              <a:rPr lang="en-US" dirty="0"/>
+              <a:t> comparing specific columns, as well as creating plots to really give us answers in finding what makes a Disney blockbuster!</a:t>
+            </a:r>
+          </a:p>
+        </p:txBody>
+      </p:sp>
+      <p:pic>
+        <p:nvPicPr>
+          <p:cNvPr id="7" name="Picture 6">
+            <a:extLst>
+              <a:ext uri="{FF2B5EF4-FFF2-40B4-BE49-F238E27FC236}">
+                <a16:creationId xmlns:a16="http://schemas.microsoft.com/office/drawing/2014/main" id="{010FA9BD-841A-467A-910F-19EE7469DD35}"/>
+              </a:ext>
+            </a:extLst>
+          </p:cNvPr>
+          <p:cNvPicPr>
+            <a:picLocks noChangeAspect="1"/>
+          </p:cNvPicPr>
+          <p:nvPr/>
+        </p:nvPicPr>
+        <p:blipFill rotWithShape="1">
+          <a:blip r:embed="rId2">
+            <a:extLst>
+              <a:ext uri="{28A0092B-C50C-407E-A947-70E740481C1C}">
+                <a14:useLocalDpi xmlns:a14="http://schemas.microsoft.com/office/drawing/2010/main" val="0"/>
+              </a:ext>
+            </a:extLst>
+          </a:blip>
+          <a:srcRect l="10662" b="6649"/>
+          <a:stretch/>
+        </p:blipFill>
+        <p:spPr>
+          <a:xfrm>
+            <a:off x="3061251" y="2543142"/>
+            <a:ext cx="5658678" cy="3227939"/>
+          </a:xfrm>
+          <a:prstGeom prst="rect">
+            <a:avLst/>
+          </a:prstGeom>
+        </p:spPr>
+      </p:pic>
+      <p:sp>
+        <p:nvSpPr>
+          <p:cNvPr id="8" name="TextBox 7">
+            <a:extLst>
+              <a:ext uri="{FF2B5EF4-FFF2-40B4-BE49-F238E27FC236}">
+                <a16:creationId xmlns:a16="http://schemas.microsoft.com/office/drawing/2014/main" id="{BBF74261-2072-472D-91BC-D6A9828CD3CB}"/>
+              </a:ext>
+            </a:extLst>
+          </p:cNvPr>
+          <p:cNvSpPr txBox="1"/>
+          <p:nvPr/>
+        </p:nvSpPr>
+        <p:spPr>
+          <a:xfrm>
+            <a:off x="2941981" y="5877580"/>
+            <a:ext cx="6096001" cy="523220"/>
+          </a:xfrm>
+          <a:prstGeom prst="rect">
+            <a:avLst/>
+          </a:prstGeom>
+          <a:noFill/>
+        </p:spPr>
+        <p:txBody>
+          <a:bodyPr wrap="square" rtlCol="0">
+            <a:spAutoFit/>
+          </a:bodyPr>
+          <a:lstStyle/>
+          <a:p>
+            <a:r>
+              <a:rPr lang="en-US" sz="1400" dirty="0"/>
+              <a:t>Dataset URL - https://www.kaggle.com/rashikrahmanpritom/disney-movies-19372016-total-gross</a:t>
+            </a:r>
+          </a:p>
+        </p:txBody>
+      </p:sp>
+      <p:pic>
+        <p:nvPicPr>
+          <p:cNvPr id="10" name="Picture 9">
+            <a:extLst>
+              <a:ext uri="{FF2B5EF4-FFF2-40B4-BE49-F238E27FC236}">
+                <a16:creationId xmlns:a16="http://schemas.microsoft.com/office/drawing/2014/main" id="{7061CB70-9AE0-412A-9928-C4562563F718}"/>
+              </a:ext>
+            </a:extLst>
+          </p:cNvPr>
+          <p:cNvPicPr>
+            <a:picLocks noChangeAspect="1"/>
+          </p:cNvPicPr>
+          <p:nvPr/>
+        </p:nvPicPr>
+        <p:blipFill>
+          <a:blip r:embed="rId3">
+            <a:extLst>
+              <a:ext uri="{BEBA8EAE-BF5A-486C-A8C5-ECC9F3942E4B}">
+                <a14:imgProps xmlns:a14="http://schemas.microsoft.com/office/drawing/2010/main">
+                  <a14:imgLayer r:embed="rId4">
+                    <a14:imgEffect>
+                      <a14:backgroundRemoval t="2051" b="89744" l="5814" r="89535">
+                        <a14:foregroundMark x1="11628" y1="90256" x2="11628" y2="90256"/>
+                        <a14:foregroundMark x1="11240" y1="31795" x2="10465" y2="26154"/>
+                        <a14:foregroundMark x1="5978" y1="3004" x2="5814" y2="2051"/>
+                        <a14:foregroundMark x1="6783" y1="7692" x2="6693" y2="7167"/>
+                        <a14:foregroundMark x1="6931" y1="8555" x2="6783" y2="7692"/>
+                        <a14:foregroundMark x1="9690" y1="24615" x2="7749" y2="13317"/>
+                        <a14:backgroundMark x1="18992" y1="13846" x2="18992" y2="13846"/>
+                        <a14:backgroundMark x1="26744" y1="9744" x2="30620" y2="14359"/>
+                        <a14:backgroundMark x1="35659" y1="9231" x2="46512" y2="22564"/>
+                        <a14:backgroundMark x1="24806" y1="22564" x2="18605" y2="22564"/>
+                        <a14:backgroundMark x1="18605" y1="22564" x2="15891" y2="25641"/>
+                        <a14:backgroundMark x1="7364" y1="2051" x2="8915" y2="5641"/>
+                        <a14:backgroundMark x1="7752" y1="8205" x2="8915" y2="12821"/>
+                        <a14:backgroundMark x1="7364" y1="7692" x2="7364" y2="7692"/>
+                        <a14:backgroundMark x1="6202" y1="2564" x2="6202" y2="1026"/>
+                        <a14:backgroundMark x1="6202" y1="3077" x2="6202" y2="3077"/>
+                        <a14:backgroundMark x1="6977" y1="6154" x2="6977" y2="6154"/>
+                      </a14:backgroundRemoval>
+                    </a14:imgEffect>
+                  </a14:imgLayer>
+                </a14:imgProps>
+              </a:ext>
+              <a:ext uri="{28A0092B-C50C-407E-A947-70E740481C1C}">
+                <a14:useLocalDpi xmlns:a14="http://schemas.microsoft.com/office/drawing/2010/main" val="0"/>
+              </a:ext>
+            </a:extLst>
+          </a:blip>
+          <a:stretch>
+            <a:fillRect/>
+          </a:stretch>
+        </p:blipFill>
+        <p:spPr>
+          <a:xfrm>
+            <a:off x="9550492" y="3631095"/>
+            <a:ext cx="3517020" cy="2658212"/>
+          </a:xfrm>
+          <a:prstGeom prst="rect">
+            <a:avLst/>
+          </a:prstGeom>
+        </p:spPr>
+      </p:pic>
     </p:spTree>
     <p:extLst>
       <p:ext uri="{BB962C8B-B14F-4D97-AF65-F5344CB8AC3E}">
         <p14:creationId xmlns:p14="http://schemas.microsoft.com/office/powerpoint/2010/main" val="288262142"/>
+      </p:ext>
+    </p:extLst>
+  </p:cSld>
+  <p:clrMapOvr>
+    <a:masterClrMapping/>
+  </p:clrMapOvr>
+</p:sld>
+</file>
+
+<file path=ppt/slides/slide4.xml><?xml version="1.0" encoding="utf-8"?>
+<p:sld xmlns:a="http://schemas.openxmlformats.org/drawingml/2006/main" xmlns:r="http://schemas.openxmlformats.org/officeDocument/2006/relationships" xmlns:p="http://schemas.openxmlformats.org/presentationml/2006/main">
+  <p:cSld>
+    <p:spTree>
+      <p:nvGrpSpPr>
+        <p:cNvPr id="1" name=""/>
+        <p:cNvGrpSpPr/>
+        <p:nvPr/>
+      </p:nvGrpSpPr>
+      <p:grpSpPr>
+        <a:xfrm>
+          <a:off x="0" y="0"/>
+          <a:ext cx="0" cy="0"/>
+          <a:chOff x="0" y="0"/>
+          <a:chExt cx="0" cy="0"/>
+        </a:xfrm>
+      </p:grpSpPr>
+      <p:sp>
+        <p:nvSpPr>
+          <p:cNvPr id="2" name="Title 1">
+            <a:extLst>
+              <a:ext uri="{FF2B5EF4-FFF2-40B4-BE49-F238E27FC236}">
+                <a16:creationId xmlns:a16="http://schemas.microsoft.com/office/drawing/2014/main" id="{F792C336-AA20-4215-AA3C-89DEE82D5C3A}"/>
+              </a:ext>
+            </a:extLst>
+          </p:cNvPr>
+          <p:cNvSpPr>
+            <a:spLocks noGrp="1"/>
+          </p:cNvSpPr>
+          <p:nvPr>
+            <p:ph type="title"/>
+          </p:nvPr>
+        </p:nvSpPr>
+        <p:spPr/>
+        <p:txBody>
+          <a:bodyPr/>
+          <a:lstStyle/>
+          <a:p>
+            <a:endParaRPr lang="en-US"/>
+          </a:p>
+        </p:txBody>
+      </p:sp>
+      <p:sp>
+        <p:nvSpPr>
+          <p:cNvPr id="3" name="Content Placeholder 2">
+            <a:extLst>
+              <a:ext uri="{FF2B5EF4-FFF2-40B4-BE49-F238E27FC236}">
+                <a16:creationId xmlns:a16="http://schemas.microsoft.com/office/drawing/2014/main" id="{8CA9235E-4975-4910-A463-EA2045977918}"/>
+              </a:ext>
+            </a:extLst>
+          </p:cNvPr>
+          <p:cNvSpPr>
+            <a:spLocks noGrp="1"/>
+          </p:cNvSpPr>
+          <p:nvPr>
+            <p:ph idx="1"/>
+          </p:nvPr>
+        </p:nvSpPr>
+        <p:spPr/>
+        <p:txBody>
+          <a:bodyPr/>
+          <a:lstStyle/>
+          <a:p>
+            <a:endParaRPr lang="en-US"/>
+          </a:p>
+        </p:txBody>
+      </p:sp>
+    </p:spTree>
+    <p:extLst>
+      <p:ext uri="{BB962C8B-B14F-4D97-AF65-F5344CB8AC3E}">
+        <p14:creationId xmlns:p14="http://schemas.microsoft.com/office/powerpoint/2010/main" val="4082966507"/>
       </p:ext>
     </p:extLst>
   </p:cSld>

</xml_diff>